<commit_message>
graphical engine -> graphics engine (in png)
</commit_message>
<xml_diff>
--- a/PlatformDeveloperGuide/images/uiLL.pptx
+++ b/PlatformDeveloperGuide/images/uiLL.pptx
@@ -202,7 +202,7 @@
           <a:p>
             <a:fld id="{F47202D6-4449-4ABC-9430-570B72DCED4F}" type="datetimeFigureOut">
               <a:rPr lang="en-US" smtClean="0"/>
-              <a:t>04-Aug-20</a:t>
+              <a:t>20/12/09</a:t>
             </a:fld>
             <a:endParaRPr lang="en-US"/>
           </a:p>
@@ -702,7 +702,7 @@
           <a:p>
             <a:fld id="{4E285625-C24A-4341-90BC-6CD71F835625}" type="datetimeFigureOut">
               <a:rPr lang="en-GB" smtClean="0"/>
-              <a:t>04/08/2020</a:t>
+              <a:t>09/12/2020</a:t>
             </a:fld>
             <a:endParaRPr lang="en-GB"/>
           </a:p>
@@ -902,7 +902,7 @@
           <a:p>
             <a:fld id="{4E285625-C24A-4341-90BC-6CD71F835625}" type="datetimeFigureOut">
               <a:rPr lang="en-GB" smtClean="0"/>
-              <a:t>04/08/2020</a:t>
+              <a:t>09/12/2020</a:t>
             </a:fld>
             <a:endParaRPr lang="en-GB"/>
           </a:p>
@@ -1112,7 +1112,7 @@
           <a:p>
             <a:fld id="{4E285625-C24A-4341-90BC-6CD71F835625}" type="datetimeFigureOut">
               <a:rPr lang="en-GB" smtClean="0"/>
-              <a:t>04/08/2020</a:t>
+              <a:t>09/12/2020</a:t>
             </a:fld>
             <a:endParaRPr lang="en-GB"/>
           </a:p>
@@ -1312,7 +1312,7 @@
           <a:p>
             <a:fld id="{4E285625-C24A-4341-90BC-6CD71F835625}" type="datetimeFigureOut">
               <a:rPr lang="en-GB" smtClean="0"/>
-              <a:t>04/08/2020</a:t>
+              <a:t>09/12/2020</a:t>
             </a:fld>
             <a:endParaRPr lang="en-GB"/>
           </a:p>
@@ -1588,7 +1588,7 @@
           <a:p>
             <a:fld id="{4E285625-C24A-4341-90BC-6CD71F835625}" type="datetimeFigureOut">
               <a:rPr lang="en-GB" smtClean="0"/>
-              <a:t>04/08/2020</a:t>
+              <a:t>09/12/2020</a:t>
             </a:fld>
             <a:endParaRPr lang="en-GB"/>
           </a:p>
@@ -1856,7 +1856,7 @@
           <a:p>
             <a:fld id="{4E285625-C24A-4341-90BC-6CD71F835625}" type="datetimeFigureOut">
               <a:rPr lang="en-GB" smtClean="0"/>
-              <a:t>04/08/2020</a:t>
+              <a:t>09/12/2020</a:t>
             </a:fld>
             <a:endParaRPr lang="en-GB"/>
           </a:p>
@@ -2271,7 +2271,7 @@
           <a:p>
             <a:fld id="{4E285625-C24A-4341-90BC-6CD71F835625}" type="datetimeFigureOut">
               <a:rPr lang="en-GB" smtClean="0"/>
-              <a:t>04/08/2020</a:t>
+              <a:t>09/12/2020</a:t>
             </a:fld>
             <a:endParaRPr lang="en-GB"/>
           </a:p>
@@ -2413,7 +2413,7 @@
           <a:p>
             <a:fld id="{4E285625-C24A-4341-90BC-6CD71F835625}" type="datetimeFigureOut">
               <a:rPr lang="en-GB" smtClean="0"/>
-              <a:t>04/08/2020</a:t>
+              <a:t>09/12/2020</a:t>
             </a:fld>
             <a:endParaRPr lang="en-GB"/>
           </a:p>
@@ -2526,7 +2526,7 @@
           <a:p>
             <a:fld id="{4E285625-C24A-4341-90BC-6CD71F835625}" type="datetimeFigureOut">
               <a:rPr lang="en-GB" smtClean="0"/>
-              <a:t>04/08/2020</a:t>
+              <a:t>09/12/2020</a:t>
             </a:fld>
             <a:endParaRPr lang="en-GB"/>
           </a:p>
@@ -2839,7 +2839,7 @@
           <a:p>
             <a:fld id="{4E285625-C24A-4341-90BC-6CD71F835625}" type="datetimeFigureOut">
               <a:rPr lang="en-GB" smtClean="0"/>
-              <a:t>04/08/2020</a:t>
+              <a:t>09/12/2020</a:t>
             </a:fld>
             <a:endParaRPr lang="en-GB"/>
           </a:p>
@@ -3128,7 +3128,7 @@
           <a:p>
             <a:fld id="{4E285625-C24A-4341-90BC-6CD71F835625}" type="datetimeFigureOut">
               <a:rPr lang="en-GB" smtClean="0"/>
-              <a:t>04/08/2020</a:t>
+              <a:t>09/12/2020</a:t>
             </a:fld>
             <a:endParaRPr lang="en-GB"/>
           </a:p>
@@ -3371,7 +3371,7 @@
           <a:p>
             <a:fld id="{4E285625-C24A-4341-90BC-6CD71F835625}" type="datetimeFigureOut">
               <a:rPr lang="en-GB" smtClean="0"/>
-              <a:t>04/08/2020</a:t>
+              <a:t>09/12/2020</a:t>
             </a:fld>
             <a:endParaRPr lang="en-GB"/>
           </a:p>
@@ -4024,7 +4024,7 @@
             <a:pPr algn="ctr"/>
             <a:r>
               <a:rPr lang="en-US" sz="1200" dirty="0"/>
-              <a:t>Graphical Engine</a:t>
+              <a:t>Graphics Engine</a:t>
             </a:r>
           </a:p>
         </p:txBody>
@@ -7793,7 +7793,7 @@
             <a:pPr algn="ctr"/>
             <a:r>
               <a:rPr lang="en-US" sz="1200" dirty="0"/>
-              <a:t>Graphical Engine</a:t>
+              <a:t>Graphics Engine</a:t>
             </a:r>
           </a:p>
         </p:txBody>
@@ -16772,7 +16772,7 @@
             <a:pPr algn="ctr"/>
             <a:r>
               <a:rPr lang="en-US" sz="1200" dirty="0"/>
-              <a:t>Graphical Engine</a:t>
+              <a:t>Graphics Engine</a:t>
             </a:r>
           </a:p>
         </p:txBody>
@@ -20027,7 +20027,7 @@
             <a:pPr algn="ctr"/>
             <a:r>
               <a:rPr lang="en-US" sz="1200" dirty="0"/>
-              <a:t>Graphical Engine</a:t>
+              <a:t>Graphics Engine</a:t>
             </a:r>
           </a:p>
         </p:txBody>

</xml_diff>

<commit_message>
front panel: describe custom drawing
</commit_message>
<xml_diff>
--- a/PlatformDeveloperGuide/images/uiLL.pptx
+++ b/PlatformDeveloperGuide/images/uiLL.pptx
@@ -202,7 +202,7 @@
           <a:p>
             <a:fld id="{F47202D6-4449-4ABC-9430-570B72DCED4F}" type="datetimeFigureOut">
               <a:rPr lang="en-US" smtClean="0"/>
-              <a:t>20/12/09</a:t>
+              <a:t>21/07/19</a:t>
             </a:fld>
             <a:endParaRPr lang="en-US"/>
           </a:p>
@@ -702,7 +702,7 @@
           <a:p>
             <a:fld id="{4E285625-C24A-4341-90BC-6CD71F835625}" type="datetimeFigureOut">
               <a:rPr lang="en-GB" smtClean="0"/>
-              <a:t>09/12/2020</a:t>
+              <a:t>19/07/2021</a:t>
             </a:fld>
             <a:endParaRPr lang="en-GB"/>
           </a:p>
@@ -902,7 +902,7 @@
           <a:p>
             <a:fld id="{4E285625-C24A-4341-90BC-6CD71F835625}" type="datetimeFigureOut">
               <a:rPr lang="en-GB" smtClean="0"/>
-              <a:t>09/12/2020</a:t>
+              <a:t>19/07/2021</a:t>
             </a:fld>
             <a:endParaRPr lang="en-GB"/>
           </a:p>
@@ -1112,7 +1112,7 @@
           <a:p>
             <a:fld id="{4E285625-C24A-4341-90BC-6CD71F835625}" type="datetimeFigureOut">
               <a:rPr lang="en-GB" smtClean="0"/>
-              <a:t>09/12/2020</a:t>
+              <a:t>19/07/2021</a:t>
             </a:fld>
             <a:endParaRPr lang="en-GB"/>
           </a:p>
@@ -1312,7 +1312,7 @@
           <a:p>
             <a:fld id="{4E285625-C24A-4341-90BC-6CD71F835625}" type="datetimeFigureOut">
               <a:rPr lang="en-GB" smtClean="0"/>
-              <a:t>09/12/2020</a:t>
+              <a:t>19/07/2021</a:t>
             </a:fld>
             <a:endParaRPr lang="en-GB"/>
           </a:p>
@@ -1588,7 +1588,7 @@
           <a:p>
             <a:fld id="{4E285625-C24A-4341-90BC-6CD71F835625}" type="datetimeFigureOut">
               <a:rPr lang="en-GB" smtClean="0"/>
-              <a:t>09/12/2020</a:t>
+              <a:t>19/07/2021</a:t>
             </a:fld>
             <a:endParaRPr lang="en-GB"/>
           </a:p>
@@ -1856,7 +1856,7 @@
           <a:p>
             <a:fld id="{4E285625-C24A-4341-90BC-6CD71F835625}" type="datetimeFigureOut">
               <a:rPr lang="en-GB" smtClean="0"/>
-              <a:t>09/12/2020</a:t>
+              <a:t>19/07/2021</a:t>
             </a:fld>
             <a:endParaRPr lang="en-GB"/>
           </a:p>
@@ -2271,7 +2271,7 @@
           <a:p>
             <a:fld id="{4E285625-C24A-4341-90BC-6CD71F835625}" type="datetimeFigureOut">
               <a:rPr lang="en-GB" smtClean="0"/>
-              <a:t>09/12/2020</a:t>
+              <a:t>19/07/2021</a:t>
             </a:fld>
             <a:endParaRPr lang="en-GB"/>
           </a:p>
@@ -2413,7 +2413,7 @@
           <a:p>
             <a:fld id="{4E285625-C24A-4341-90BC-6CD71F835625}" type="datetimeFigureOut">
               <a:rPr lang="en-GB" smtClean="0"/>
-              <a:t>09/12/2020</a:t>
+              <a:t>19/07/2021</a:t>
             </a:fld>
             <a:endParaRPr lang="en-GB"/>
           </a:p>
@@ -2526,7 +2526,7 @@
           <a:p>
             <a:fld id="{4E285625-C24A-4341-90BC-6CD71F835625}" type="datetimeFigureOut">
               <a:rPr lang="en-GB" smtClean="0"/>
-              <a:t>09/12/2020</a:t>
+              <a:t>19/07/2021</a:t>
             </a:fld>
             <a:endParaRPr lang="en-GB"/>
           </a:p>
@@ -2839,7 +2839,7 @@
           <a:p>
             <a:fld id="{4E285625-C24A-4341-90BC-6CD71F835625}" type="datetimeFigureOut">
               <a:rPr lang="en-GB" smtClean="0"/>
-              <a:t>09/12/2020</a:t>
+              <a:t>19/07/2021</a:t>
             </a:fld>
             <a:endParaRPr lang="en-GB"/>
           </a:p>
@@ -3128,7 +3128,7 @@
           <a:p>
             <a:fld id="{4E285625-C24A-4341-90BC-6CD71F835625}" type="datetimeFigureOut">
               <a:rPr lang="en-GB" smtClean="0"/>
-              <a:t>09/12/2020</a:t>
+              <a:t>19/07/2021</a:t>
             </a:fld>
             <a:endParaRPr lang="en-GB"/>
           </a:p>
@@ -3371,7 +3371,7 @@
           <a:p>
             <a:fld id="{4E285625-C24A-4341-90BC-6CD71F835625}" type="datetimeFigureOut">
               <a:rPr lang="en-GB" smtClean="0"/>
-              <a:t>09/12/2020</a:t>
+              <a:t>19/07/2021</a:t>
             </a:fld>
             <a:endParaRPr lang="en-GB"/>
           </a:p>
@@ -4830,8 +4830,8 @@
         </p:nvSpPr>
         <p:spPr>
           <a:xfrm>
-            <a:off x="295233" y="3631786"/>
-            <a:ext cx="3328283" cy="276999"/>
+            <a:off x="335184" y="3622936"/>
+            <a:ext cx="2767809" cy="276999"/>
           </a:xfrm>
           <a:prstGeom prst="rect">
             <a:avLst/>
@@ -4850,7 +4850,7 @@
             </a:r>
             <a:r>
               <a:rPr lang="en-US" sz="1200" dirty="0" err="1"/>
-              <a:t>com.microej.clibrary.llimpl#microui-drawings</a:t>
+              <a:t>com.microej.clibrary.llimpl#microui</a:t>
             </a:r>
             <a:endParaRPr lang="en-US" sz="1200" dirty="0"/>
           </a:p>

</xml_diff>